<commit_message>
finished Matter section, added all the sections
</commit_message>
<xml_diff>
--- a/Presentatie/ProjectThreadMatter.pptx
+++ b/Presentatie/ProjectThreadMatter.pptx
@@ -5,7 +5,7 @@
     <p:sldMasterId id="2147484099" r:id="rId1"/>
   </p:sldMasterIdLst>
   <p:notesMasterIdLst>
-    <p:notesMasterId r:id="rId35"/>
+    <p:notesMasterId r:id="rId38"/>
   </p:notesMasterIdLst>
   <p:sldIdLst>
     <p:sldId id="256" r:id="rId2"/>
@@ -37,10 +37,13 @@
     <p:sldId id="277" r:id="rId28"/>
     <p:sldId id="268" r:id="rId29"/>
     <p:sldId id="269" r:id="rId30"/>
-    <p:sldId id="270" r:id="rId31"/>
+    <p:sldId id="290" r:id="rId31"/>
     <p:sldId id="271" r:id="rId32"/>
     <p:sldId id="260" r:id="rId33"/>
-    <p:sldId id="288" r:id="rId34"/>
+    <p:sldId id="291" r:id="rId34"/>
+    <p:sldId id="292" r:id="rId35"/>
+    <p:sldId id="293" r:id="rId36"/>
+    <p:sldId id="288" r:id="rId37"/>
   </p:sldIdLst>
   <p:sldSz cx="12192000" cy="6858000"/>
   <p:notesSz cx="6858000" cy="9144000"/>
@@ -200,10 +203,41 @@
         <p14:section name="Hub &amp; Bridge" id="{E1D12BC7-1AFF-4D7F-AF83-430EB5EF9C1A}">
           <p14:sldIdLst>
             <p14:sldId id="268"/>
+          </p14:sldIdLst>
+        </p14:section>
+        <p14:section name="CSA Membership" id="{2E194BCD-0897-4631-B37E-66D15BF21670}">
+          <p14:sldIdLst>
             <p14:sldId id="269"/>
-            <p14:sldId id="270"/>
+            <p14:sldId id="290"/>
+          </p14:sldIdLst>
+        </p14:section>
+        <p14:section name="Develop with matter" id="{2C692B9E-807D-4BFA-ABF1-869513B8D552}">
+          <p14:sldIdLst>
             <p14:sldId id="271"/>
+          </p14:sldIdLst>
+        </p14:section>
+        <p14:section name="OpenThread" id="{CE730125-611A-4EEC-8D64-02D2CB4DB034}">
+          <p14:sldIdLst>
             <p14:sldId id="260"/>
+          </p14:sldIdLst>
+        </p14:section>
+        <p14:section name="Game controller" id="{9BB2D5DE-18BA-4873-92BE-F2601516570C}">
+          <p14:sldIdLst>
+            <p14:sldId id="291"/>
+          </p14:sldIdLst>
+        </p14:section>
+        <p14:section name="Matter controller" id="{7EFCB405-05FA-483B-86E5-F22146E40453}">
+          <p14:sldIdLst>
+            <p14:sldId id="292"/>
+          </p14:sldIdLst>
+        </p14:section>
+        <p14:section name="Breakout game" id="{BAED3D76-3466-4336-825A-44E4C606706F}">
+          <p14:sldIdLst>
+            <p14:sldId id="293"/>
+          </p14:sldIdLst>
+        </p14:section>
+        <p14:section name="Q&amp;A" id="{87C16A0C-7204-4241-8FC0-19ABF94D25F5}">
+          <p14:sldIdLst>
             <p14:sldId id="288"/>
           </p14:sldIdLst>
         </p14:section>
@@ -801,7 +835,10 @@
           <a:bodyPr/>
           <a:lstStyle/>
           <a:p>
-            <a:endParaRPr lang="en-US" dirty="0"/>
+            <a:r>
+              <a:rPr lang="en-US" dirty="0"/>
+              <a:t>Specification</a:t>
+            </a:r>
           </a:p>
         </p:txBody>
       </p:sp>
@@ -8071,6 +8108,12 @@
               <a:t>Events</a:t>
             </a:r>
           </a:p>
+          <a:p>
+            <a:r>
+              <a:rPr lang="en-US" dirty="0"/>
+              <a:t>Application cluster specification</a:t>
+            </a:r>
+          </a:p>
         </p:txBody>
       </p:sp>
       <p:sp>
@@ -8277,6 +8320,12 @@
               <a:t>Intended to ensure interoperability</a:t>
             </a:r>
           </a:p>
+          <a:p>
+            <a:r>
+              <a:rPr lang="en-US" dirty="0"/>
+              <a:t>Device library specification</a:t>
+            </a:r>
+          </a:p>
         </p:txBody>
       </p:sp>
       <p:sp>
@@ -10521,7 +10570,7 @@
           <a:p>
             <a:r>
               <a:rPr lang="en-US" dirty="0"/>
-              <a:t>Matter – Multi-Admin</a:t>
+              <a:t>Matter – Multiple Fabrics</a:t>
             </a:r>
           </a:p>
         </p:txBody>
@@ -10618,7 +10667,7 @@
         </p:blipFill>
         <p:spPr>
           <a:xfrm flipH="1">
-            <a:off x="5971865" y="1373098"/>
+            <a:off x="5955661" y="1373098"/>
             <a:ext cx="6249020" cy="5484902"/>
           </a:xfrm>
           <a:prstGeom prst="rect">
@@ -10640,8 +10689,8 @@
         </p:nvSpPr>
         <p:spPr>
           <a:xfrm>
-            <a:off x="5100948" y="3784601"/>
-            <a:ext cx="1933575" cy="1152525"/>
+            <a:off x="3541073" y="1871197"/>
+            <a:ext cx="5012687" cy="1929651"/>
           </a:xfrm>
           <a:prstGeom prst="ellipse">
             <a:avLst/>
@@ -10669,7 +10718,7 @@
           <a:lstStyle/>
           <a:p>
             <a:pPr algn="ctr"/>
-            <a:endParaRPr lang="en-US"/>
+            <a:endParaRPr lang="en-US" dirty="0"/>
           </a:p>
         </p:txBody>
       </p:sp>
@@ -10733,35 +10782,38 @@
       </p:sp>
       <p:sp>
         <p:nvSpPr>
-          <p:cNvPr id="3" name="Content Placeholder 2">
-            <a:extLst>
-              <a:ext uri="{FF2B5EF4-FFF2-40B4-BE49-F238E27FC236}">
-                <a16:creationId xmlns:a16="http://schemas.microsoft.com/office/drawing/2014/main" id="{FF01C297-C12A-79DC-EB8D-DBE66056B72E}"/>
-              </a:ext>
-            </a:extLst>
-          </p:cNvPr>
-          <p:cNvSpPr>
-            <a:spLocks noGrp="1"/>
-          </p:cNvSpPr>
-          <p:nvPr>
-            <p:ph sz="half" idx="1"/>
-          </p:nvPr>
-        </p:nvSpPr>
-        <p:spPr/>
-        <p:txBody>
-          <a:bodyPr/>
-          <a:lstStyle/>
-          <a:p>
-            <a:endParaRPr lang="en-US"/>
-          </a:p>
-        </p:txBody>
-      </p:sp>
-      <p:sp>
-        <p:nvSpPr>
-          <p:cNvPr id="4" name="Content Placeholder 3">
-            <a:extLst>
-              <a:ext uri="{FF2B5EF4-FFF2-40B4-BE49-F238E27FC236}">
-                <a16:creationId xmlns:a16="http://schemas.microsoft.com/office/drawing/2014/main" id="{ADF718B8-406E-1529-A66A-196EFEF164AC}"/>
+          <p:cNvPr id="6" name="Text Placeholder 5">
+            <a:extLst>
+              <a:ext uri="{FF2B5EF4-FFF2-40B4-BE49-F238E27FC236}">
+                <a16:creationId xmlns:a16="http://schemas.microsoft.com/office/drawing/2014/main" id="{BEF6E375-785A-F4AE-E11A-5DE6E3E900AC}"/>
+              </a:ext>
+            </a:extLst>
+          </p:cNvPr>
+          <p:cNvSpPr>
+            <a:spLocks noGrp="1"/>
+          </p:cNvSpPr>
+          <p:nvPr>
+            <p:ph type="body" idx="1"/>
+          </p:nvPr>
+        </p:nvSpPr>
+        <p:spPr/>
+        <p:txBody>
+          <a:bodyPr/>
+          <a:lstStyle/>
+          <a:p>
+            <a:r>
+              <a:rPr lang="en-US" dirty="0"/>
+              <a:t>Hub</a:t>
+            </a:r>
+          </a:p>
+        </p:txBody>
+      </p:sp>
+      <p:sp>
+        <p:nvSpPr>
+          <p:cNvPr id="7" name="Content Placeholder 6">
+            <a:extLst>
+              <a:ext uri="{FF2B5EF4-FFF2-40B4-BE49-F238E27FC236}">
+                <a16:creationId xmlns:a16="http://schemas.microsoft.com/office/drawing/2014/main" id="{6D0E3BD0-D2E3-70B2-6977-09AC2A1FDE97}"/>
               </a:ext>
             </a:extLst>
           </p:cNvPr>
@@ -10777,7 +10829,84 @@
           <a:bodyPr/>
           <a:lstStyle/>
           <a:p>
-            <a:endParaRPr lang="en-US"/>
+            <a:r>
+              <a:rPr lang="en-US" dirty="0"/>
+              <a:t>Serves as controller</a:t>
+            </a:r>
+          </a:p>
+          <a:p>
+            <a:r>
+              <a:rPr lang="en-US" dirty="0"/>
+              <a:t>Not tied to ecosystem</a:t>
+            </a:r>
+          </a:p>
+          <a:p>
+            <a:r>
+              <a:rPr lang="en-US" dirty="0"/>
+              <a:t>Often functions as Border Router</a:t>
+            </a:r>
+          </a:p>
+        </p:txBody>
+      </p:sp>
+      <p:sp>
+        <p:nvSpPr>
+          <p:cNvPr id="8" name="Text Placeholder 7">
+            <a:extLst>
+              <a:ext uri="{FF2B5EF4-FFF2-40B4-BE49-F238E27FC236}">
+                <a16:creationId xmlns:a16="http://schemas.microsoft.com/office/drawing/2014/main" id="{55B7D7CF-44A1-1B77-880C-7222EFEA3406}"/>
+              </a:ext>
+            </a:extLst>
+          </p:cNvPr>
+          <p:cNvSpPr>
+            <a:spLocks noGrp="1"/>
+          </p:cNvSpPr>
+          <p:nvPr>
+            <p:ph type="body" sz="quarter" idx="3"/>
+          </p:nvPr>
+        </p:nvSpPr>
+        <p:spPr/>
+        <p:txBody>
+          <a:bodyPr/>
+          <a:lstStyle/>
+          <a:p>
+            <a:r>
+              <a:rPr lang="en-US" dirty="0"/>
+              <a:t>Bridge</a:t>
+            </a:r>
+          </a:p>
+        </p:txBody>
+      </p:sp>
+      <p:sp>
+        <p:nvSpPr>
+          <p:cNvPr id="9" name="Content Placeholder 8">
+            <a:extLst>
+              <a:ext uri="{FF2B5EF4-FFF2-40B4-BE49-F238E27FC236}">
+                <a16:creationId xmlns:a16="http://schemas.microsoft.com/office/drawing/2014/main" id="{3DC5B5F9-A101-AF72-BBDD-7D302B2A89BF}"/>
+              </a:ext>
+            </a:extLst>
+          </p:cNvPr>
+          <p:cNvSpPr>
+            <a:spLocks noGrp="1"/>
+          </p:cNvSpPr>
+          <p:nvPr>
+            <p:ph sz="quarter" idx="4"/>
+          </p:nvPr>
+        </p:nvSpPr>
+        <p:spPr/>
+        <p:txBody>
+          <a:bodyPr/>
+          <a:lstStyle/>
+          <a:p>
+            <a:r>
+              <a:rPr lang="en-US" dirty="0"/>
+              <a:t>Add more flexibility</a:t>
+            </a:r>
+          </a:p>
+          <a:p>
+            <a:r>
+              <a:rPr lang="en-US" dirty="0"/>
+              <a:t>Acts as translator for non-Matter devices</a:t>
+            </a:r>
           </a:p>
         </p:txBody>
       </p:sp>
@@ -10868,36 +10997,84 @@
           </a:p>
         </p:txBody>
       </p:sp>
-      <p:pic>
-        <p:nvPicPr>
-          <p:cNvPr id="6" name="Picture 5">
-            <a:extLst>
-              <a:ext uri="{FF2B5EF4-FFF2-40B4-BE49-F238E27FC236}">
-                <a16:creationId xmlns:a16="http://schemas.microsoft.com/office/drawing/2014/main" id="{8A3AB1FB-5128-62F0-34F2-C921977A5333}"/>
-              </a:ext>
-            </a:extLst>
-          </p:cNvPr>
-          <p:cNvPicPr>
-            <a:picLocks noChangeAspect="1"/>
-          </p:cNvPicPr>
-          <p:nvPr/>
-        </p:nvPicPr>
-        <p:blipFill>
-          <a:blip r:embed="rId2"/>
-          <a:stretch>
-            <a:fillRect/>
-          </a:stretch>
-        </p:blipFill>
-        <p:spPr>
-          <a:xfrm>
-            <a:off x="346047" y="1791012"/>
-            <a:ext cx="9030643" cy="3720102"/>
-          </a:xfrm>
-          <a:prstGeom prst="rect">
-            <a:avLst/>
-          </a:prstGeom>
-        </p:spPr>
-      </p:pic>
+      <p:sp>
+        <p:nvSpPr>
+          <p:cNvPr id="3" name="Content Placeholder 2">
+            <a:extLst>
+              <a:ext uri="{FF2B5EF4-FFF2-40B4-BE49-F238E27FC236}">
+                <a16:creationId xmlns:a16="http://schemas.microsoft.com/office/drawing/2014/main" id="{EB3EBEBC-519F-7BD3-0413-1F108409D286}"/>
+              </a:ext>
+            </a:extLst>
+          </p:cNvPr>
+          <p:cNvSpPr>
+            <a:spLocks noGrp="1"/>
+          </p:cNvSpPr>
+          <p:nvPr>
+            <p:ph sz="half" idx="1"/>
+          </p:nvPr>
+        </p:nvSpPr>
+        <p:spPr/>
+        <p:txBody>
+          <a:bodyPr/>
+          <a:lstStyle/>
+          <a:p>
+            <a:r>
+              <a:rPr lang="en-US" dirty="0"/>
+              <a:t>Membership necessary for certifying</a:t>
+            </a:r>
+          </a:p>
+          <a:p>
+            <a:r>
+              <a:rPr lang="en-US" dirty="0"/>
+              <a:t>Official resources</a:t>
+            </a:r>
+          </a:p>
+          <a:p>
+            <a:r>
+              <a:rPr lang="en-US" sz="1800" dirty="0">
+                <a:effectLst/>
+                <a:latin typeface="Arial" panose="020B0604020202020204" pitchFamily="34" charset="0"/>
+                <a:ea typeface="Times New Roman" panose="02020603050405020304" pitchFamily="18" charset="0"/>
+              </a:rPr>
+              <a:t>Authorization to contribute </a:t>
+            </a:r>
+          </a:p>
+          <a:p>
+            <a:r>
+              <a:rPr lang="en-US" dirty="0">
+                <a:latin typeface="Arial" panose="020B0604020202020204" pitchFamily="34" charset="0"/>
+              </a:rPr>
+              <a:t>Unique Vendor ID</a:t>
+            </a:r>
+            <a:endParaRPr lang="en-US" dirty="0"/>
+          </a:p>
+        </p:txBody>
+      </p:sp>
+      <p:sp>
+        <p:nvSpPr>
+          <p:cNvPr id="4" name="Content Placeholder 3">
+            <a:extLst>
+              <a:ext uri="{FF2B5EF4-FFF2-40B4-BE49-F238E27FC236}">
+                <a16:creationId xmlns:a16="http://schemas.microsoft.com/office/drawing/2014/main" id="{32403844-7931-A414-20AE-EC6FDC94D7C8}"/>
+              </a:ext>
+            </a:extLst>
+          </p:cNvPr>
+          <p:cNvSpPr>
+            <a:spLocks noGrp="1"/>
+          </p:cNvSpPr>
+          <p:nvPr>
+            <p:ph sz="half" idx="2"/>
+          </p:nvPr>
+        </p:nvSpPr>
+        <p:spPr/>
+        <p:txBody>
+          <a:bodyPr/>
+          <a:lstStyle/>
+          <a:p>
+            <a:endParaRPr lang="en-US"/>
+          </a:p>
+        </p:txBody>
+      </p:sp>
       <p:sp>
         <p:nvSpPr>
           <p:cNvPr id="7" name="Slide Number Placeholder 6">
@@ -11036,21 +11213,21 @@
           </a:p>
           <a:p>
             <a:r>
-              <a:rPr lang="nl-BE" dirty="0" err="1"/>
-              <a:t>Accelerometer</a:t>
-            </a:r>
-            <a:endParaRPr lang="nl-BE" dirty="0"/>
-          </a:p>
-          <a:p>
-            <a:r>
               <a:rPr lang="nl-BE" dirty="0"/>
-              <a:t>Controller </a:t>
-            </a:r>
-            <a:r>
-              <a:rPr lang="nl-BE" dirty="0" err="1"/>
-              <a:t>application</a:t>
-            </a:r>
-            <a:endParaRPr lang="nl-BE" dirty="0"/>
+              <a:t>Game controller</a:t>
+            </a:r>
+          </a:p>
+          <a:p>
+            <a:r>
+              <a:rPr lang="nl-BE" dirty="0"/>
+              <a:t>Matter controller</a:t>
+            </a:r>
+          </a:p>
+          <a:p>
+            <a:r>
+              <a:rPr lang="nl-BE" dirty="0"/>
+              <a:t>Breakout game</a:t>
+            </a:r>
           </a:p>
           <a:p>
             <a:r>
@@ -11160,38 +11337,10 @@
       </p:grpSpPr>
       <p:sp>
         <p:nvSpPr>
-          <p:cNvPr id="2" name="Title 1">
-            <a:extLst>
-              <a:ext uri="{FF2B5EF4-FFF2-40B4-BE49-F238E27FC236}">
-                <a16:creationId xmlns:a16="http://schemas.microsoft.com/office/drawing/2014/main" id="{B3A0456A-85A3-899D-1779-2C5B29ABF814}"/>
-              </a:ext>
-            </a:extLst>
-          </p:cNvPr>
-          <p:cNvSpPr>
-            <a:spLocks noGrp="1"/>
-          </p:cNvSpPr>
-          <p:nvPr>
-            <p:ph type="title"/>
-          </p:nvPr>
-        </p:nvSpPr>
-        <p:spPr/>
-        <p:txBody>
-          <a:bodyPr/>
-          <a:lstStyle/>
-          <a:p>
-            <a:r>
-              <a:rPr lang="en-US" dirty="0"/>
-              <a:t>Matter – Hardware</a:t>
-            </a:r>
-          </a:p>
-        </p:txBody>
-      </p:sp>
-      <p:sp>
-        <p:nvSpPr>
           <p:cNvPr id="3" name="Content Placeholder 2">
             <a:extLst>
               <a:ext uri="{FF2B5EF4-FFF2-40B4-BE49-F238E27FC236}">
-                <a16:creationId xmlns:a16="http://schemas.microsoft.com/office/drawing/2014/main" id="{EEE256C6-A04F-2CE1-9815-F03AC6BADD71}"/>
+                <a16:creationId xmlns:a16="http://schemas.microsoft.com/office/drawing/2014/main" id="{FDBB1A34-3DD3-25A7-51BD-D32E619604CE}"/>
               </a:ext>
             </a:extLst>
           </p:cNvPr>
@@ -11213,35 +11362,10 @@
       </p:sp>
       <p:sp>
         <p:nvSpPr>
-          <p:cNvPr id="4" name="Content Placeholder 3">
-            <a:extLst>
-              <a:ext uri="{FF2B5EF4-FFF2-40B4-BE49-F238E27FC236}">
-                <a16:creationId xmlns:a16="http://schemas.microsoft.com/office/drawing/2014/main" id="{63ABE3FC-3ABB-3B03-E7B8-62AD8C79E6BF}"/>
-              </a:ext>
-            </a:extLst>
-          </p:cNvPr>
-          <p:cNvSpPr>
-            <a:spLocks noGrp="1"/>
-          </p:cNvSpPr>
-          <p:nvPr>
-            <p:ph sz="half" idx="2"/>
-          </p:nvPr>
-        </p:nvSpPr>
-        <p:spPr/>
-        <p:txBody>
-          <a:bodyPr/>
-          <a:lstStyle/>
-          <a:p>
-            <a:endParaRPr lang="en-US"/>
-          </a:p>
-        </p:txBody>
-      </p:sp>
-      <p:sp>
-        <p:nvSpPr>
           <p:cNvPr id="5" name="Slide Number Placeholder 4">
             <a:extLst>
               <a:ext uri="{FF2B5EF4-FFF2-40B4-BE49-F238E27FC236}">
-                <a16:creationId xmlns:a16="http://schemas.microsoft.com/office/drawing/2014/main" id="{610EC97A-6E81-1B76-3730-694721D3D70E}"/>
+                <a16:creationId xmlns:a16="http://schemas.microsoft.com/office/drawing/2014/main" id="{7721DAAD-6DE9-609E-00FA-4F4E30A129C0}"/>
               </a:ext>
             </a:extLst>
           </p:cNvPr>
@@ -11265,10 +11389,40 @@
           </a:p>
         </p:txBody>
       </p:sp>
+      <p:pic>
+        <p:nvPicPr>
+          <p:cNvPr id="6" name="Picture 5">
+            <a:extLst>
+              <a:ext uri="{FF2B5EF4-FFF2-40B4-BE49-F238E27FC236}">
+                <a16:creationId xmlns:a16="http://schemas.microsoft.com/office/drawing/2014/main" id="{41005D0F-E7B1-A7D0-AB0B-33CE7ED158C7}"/>
+              </a:ext>
+            </a:extLst>
+          </p:cNvPr>
+          <p:cNvPicPr>
+            <a:picLocks noChangeAspect="1"/>
+          </p:cNvPicPr>
+          <p:nvPr/>
+        </p:nvPicPr>
+        <p:blipFill>
+          <a:blip r:embed="rId2"/>
+          <a:stretch>
+            <a:fillRect/>
+          </a:stretch>
+        </p:blipFill>
+        <p:spPr>
+          <a:xfrm>
+            <a:off x="677332" y="-14021"/>
+            <a:ext cx="8078997" cy="6872021"/>
+          </a:xfrm>
+          <a:prstGeom prst="rect">
+            <a:avLst/>
+          </a:prstGeom>
+        </p:spPr>
+      </p:pic>
     </p:spTree>
     <p:extLst>
       <p:ext uri="{BB962C8B-B14F-4D97-AF65-F5344CB8AC3E}">
-        <p14:creationId xmlns:p14="http://schemas.microsoft.com/office/powerpoint/2010/main" val="1631806897"/>
+        <p14:creationId xmlns:p14="http://schemas.microsoft.com/office/powerpoint/2010/main" val="1893796954"/>
       </p:ext>
     </p:extLst>
   </p:cSld>
@@ -11344,6 +11498,58 @@
           <a:bodyPr/>
           <a:lstStyle/>
           <a:p>
+            <a:r>
+              <a:rPr lang="en-US" dirty="0" err="1"/>
+              <a:t>Github</a:t>
+            </a:r>
+            <a:r>
+              <a:rPr lang="en-US" dirty="0"/>
+              <a:t> project-chip</a:t>
+            </a:r>
+          </a:p>
+          <a:p>
+            <a:pPr lvl="1"/>
+            <a:r>
+              <a:rPr lang="en-US" dirty="0"/>
+              <a:t>SDK</a:t>
+            </a:r>
+          </a:p>
+          <a:p>
+            <a:pPr lvl="1"/>
+            <a:r>
+              <a:rPr lang="en-US" dirty="0"/>
+              <a:t>Documentation</a:t>
+            </a:r>
+          </a:p>
+          <a:p>
+            <a:pPr lvl="1"/>
+            <a:r>
+              <a:rPr lang="en-US" dirty="0"/>
+              <a:t>Certification tool</a:t>
+            </a:r>
+          </a:p>
+          <a:p>
+            <a:r>
+              <a:rPr lang="en-US" dirty="0"/>
+              <a:t>Manufacturer SDK</a:t>
+            </a:r>
+          </a:p>
+          <a:p>
+            <a:pPr lvl="1"/>
+            <a:r>
+              <a:rPr lang="en-US" dirty="0"/>
+              <a:t>Manufacturer IDE</a:t>
+            </a:r>
+          </a:p>
+          <a:p>
+            <a:pPr lvl="1"/>
+            <a:r>
+              <a:rPr lang="en-US" dirty="0"/>
+              <a:t>A lot of examples you can use</a:t>
+            </a:r>
+          </a:p>
+          <a:p>
+            <a:pPr lvl="1"/>
             <a:endParaRPr lang="en-US" dirty="0"/>
           </a:p>
         </p:txBody>
@@ -11483,13 +11689,31 @@
           <a:p>
             <a:r>
               <a:rPr lang="en-US" dirty="0"/>
-              <a:t>IPv6 mesh network</a:t>
+              <a:t>Mesh Network-protocol</a:t>
+            </a:r>
+          </a:p>
+          <a:p>
+            <a:r>
+              <a:rPr lang="en-US" dirty="0"/>
+              <a:t>IPv6</a:t>
             </a:r>
           </a:p>
           <a:p>
             <a:r>
               <a:rPr lang="en-US" dirty="0"/>
               <a:t>Low-power</a:t>
+            </a:r>
+          </a:p>
+          <a:p>
+            <a:r>
+              <a:rPr lang="en-US" dirty="0"/>
+              <a:t>Ideal for smart-home devices</a:t>
+            </a:r>
+          </a:p>
+          <a:p>
+            <a:r>
+              <a:rPr lang="en-US" dirty="0"/>
+              <a:t>Border Router</a:t>
             </a:r>
           </a:p>
           <a:p>
@@ -11526,6 +11750,36 @@
           </a:p>
         </p:txBody>
       </p:sp>
+      <p:pic>
+        <p:nvPicPr>
+          <p:cNvPr id="6" name="Picture 5">
+            <a:extLst>
+              <a:ext uri="{FF2B5EF4-FFF2-40B4-BE49-F238E27FC236}">
+                <a16:creationId xmlns:a16="http://schemas.microsoft.com/office/drawing/2014/main" id="{1B95AFD1-CEA5-D50A-F9AA-B7DB8C4514BE}"/>
+              </a:ext>
+            </a:extLst>
+          </p:cNvPr>
+          <p:cNvPicPr>
+            <a:picLocks noChangeAspect="1"/>
+          </p:cNvPicPr>
+          <p:nvPr/>
+        </p:nvPicPr>
+        <p:blipFill>
+          <a:blip r:embed="rId2"/>
+          <a:stretch>
+            <a:fillRect/>
+          </a:stretch>
+        </p:blipFill>
+        <p:spPr>
+          <a:xfrm>
+            <a:off x="4276389" y="536006"/>
+            <a:ext cx="7915611" cy="5687918"/>
+          </a:xfrm>
+          <a:prstGeom prst="rect">
+            <a:avLst/>
+          </a:prstGeom>
+        </p:spPr>
+      </p:pic>
     </p:spTree>
     <p:extLst>
       <p:ext uri="{BB962C8B-B14F-4D97-AF65-F5344CB8AC3E}">
@@ -11558,6 +11812,336 @@
       </p:grpSpPr>
       <p:sp>
         <p:nvSpPr>
+          <p:cNvPr id="2" name="Title 1">
+            <a:extLst>
+              <a:ext uri="{FF2B5EF4-FFF2-40B4-BE49-F238E27FC236}">
+                <a16:creationId xmlns:a16="http://schemas.microsoft.com/office/drawing/2014/main" id="{260CBF3D-B1E6-FE1E-7F83-6AD5A662C2FE}"/>
+              </a:ext>
+            </a:extLst>
+          </p:cNvPr>
+          <p:cNvSpPr>
+            <a:spLocks noGrp="1"/>
+          </p:cNvSpPr>
+          <p:nvPr>
+            <p:ph type="title"/>
+          </p:nvPr>
+        </p:nvSpPr>
+        <p:spPr/>
+        <p:txBody>
+          <a:bodyPr/>
+          <a:lstStyle/>
+          <a:p>
+            <a:r>
+              <a:rPr lang="en-US" dirty="0"/>
+              <a:t>Game controller</a:t>
+            </a:r>
+          </a:p>
+        </p:txBody>
+      </p:sp>
+      <p:sp>
+        <p:nvSpPr>
+          <p:cNvPr id="3" name="Content Placeholder 2">
+            <a:extLst>
+              <a:ext uri="{FF2B5EF4-FFF2-40B4-BE49-F238E27FC236}">
+                <a16:creationId xmlns:a16="http://schemas.microsoft.com/office/drawing/2014/main" id="{CA6CEB04-6519-2FDE-5448-35C05E4656D9}"/>
+              </a:ext>
+            </a:extLst>
+          </p:cNvPr>
+          <p:cNvSpPr>
+            <a:spLocks noGrp="1"/>
+          </p:cNvSpPr>
+          <p:nvPr>
+            <p:ph idx="1"/>
+          </p:nvPr>
+        </p:nvSpPr>
+        <p:spPr/>
+        <p:txBody>
+          <a:bodyPr/>
+          <a:lstStyle/>
+          <a:p>
+            <a:endParaRPr lang="en-US" dirty="0"/>
+          </a:p>
+        </p:txBody>
+      </p:sp>
+      <p:sp>
+        <p:nvSpPr>
+          <p:cNvPr id="4" name="Slide Number Placeholder 3">
+            <a:extLst>
+              <a:ext uri="{FF2B5EF4-FFF2-40B4-BE49-F238E27FC236}">
+                <a16:creationId xmlns:a16="http://schemas.microsoft.com/office/drawing/2014/main" id="{9E89A326-C7A3-7600-E3DA-9D97069671A4}"/>
+              </a:ext>
+            </a:extLst>
+          </p:cNvPr>
+          <p:cNvSpPr>
+            <a:spLocks noGrp="1"/>
+          </p:cNvSpPr>
+          <p:nvPr>
+            <p:ph type="sldNum" sz="quarter" idx="12"/>
+          </p:nvPr>
+        </p:nvSpPr>
+        <p:spPr/>
+        <p:txBody>
+          <a:bodyPr/>
+          <a:lstStyle/>
+          <a:p>
+            <a:fld id="{E120E24D-9AC4-413F-A247-89E1AB2D5697}" type="slidenum">
+              <a:rPr lang="nl-BE" smtClean="0"/>
+              <a:t>33</a:t>
+            </a:fld>
+            <a:endParaRPr lang="nl-BE"/>
+          </a:p>
+        </p:txBody>
+      </p:sp>
+    </p:spTree>
+    <p:extLst>
+      <p:ext uri="{BB962C8B-B14F-4D97-AF65-F5344CB8AC3E}">
+        <p14:creationId xmlns:p14="http://schemas.microsoft.com/office/powerpoint/2010/main" val="898054552"/>
+      </p:ext>
+    </p:extLst>
+  </p:cSld>
+  <p:clrMapOvr>
+    <a:masterClrMapping/>
+  </p:clrMapOvr>
+</p:sld>
+</file>
+
+<file path=ppt/slides/slide34.xml><?xml version="1.0" encoding="utf-8"?>
+<p:sld xmlns:a="http://schemas.openxmlformats.org/drawingml/2006/main" xmlns:r="http://schemas.openxmlformats.org/officeDocument/2006/relationships" xmlns:p="http://schemas.openxmlformats.org/presentationml/2006/main">
+  <p:cSld>
+    <p:spTree>
+      <p:nvGrpSpPr>
+        <p:cNvPr id="1" name=""/>
+        <p:cNvGrpSpPr/>
+        <p:nvPr/>
+      </p:nvGrpSpPr>
+      <p:grpSpPr>
+        <a:xfrm>
+          <a:off x="0" y="0"/>
+          <a:ext cx="0" cy="0"/>
+          <a:chOff x="0" y="0"/>
+          <a:chExt cx="0" cy="0"/>
+        </a:xfrm>
+      </p:grpSpPr>
+      <p:sp>
+        <p:nvSpPr>
+          <p:cNvPr id="2" name="Title 1">
+            <a:extLst>
+              <a:ext uri="{FF2B5EF4-FFF2-40B4-BE49-F238E27FC236}">
+                <a16:creationId xmlns:a16="http://schemas.microsoft.com/office/drawing/2014/main" id="{3CE20EF9-8760-B2FF-8C7A-E3E0136D7CE1}"/>
+              </a:ext>
+            </a:extLst>
+          </p:cNvPr>
+          <p:cNvSpPr>
+            <a:spLocks noGrp="1"/>
+          </p:cNvSpPr>
+          <p:nvPr>
+            <p:ph type="title"/>
+          </p:nvPr>
+        </p:nvSpPr>
+        <p:spPr/>
+        <p:txBody>
+          <a:bodyPr/>
+          <a:lstStyle/>
+          <a:p>
+            <a:endParaRPr lang="en-US"/>
+          </a:p>
+        </p:txBody>
+      </p:sp>
+      <p:sp>
+        <p:nvSpPr>
+          <p:cNvPr id="3" name="Content Placeholder 2">
+            <a:extLst>
+              <a:ext uri="{FF2B5EF4-FFF2-40B4-BE49-F238E27FC236}">
+                <a16:creationId xmlns:a16="http://schemas.microsoft.com/office/drawing/2014/main" id="{7583EDFC-514B-A1E5-8A88-138F5011379C}"/>
+              </a:ext>
+            </a:extLst>
+          </p:cNvPr>
+          <p:cNvSpPr>
+            <a:spLocks noGrp="1"/>
+          </p:cNvSpPr>
+          <p:nvPr>
+            <p:ph idx="1"/>
+          </p:nvPr>
+        </p:nvSpPr>
+        <p:spPr/>
+        <p:txBody>
+          <a:bodyPr/>
+          <a:lstStyle/>
+          <a:p>
+            <a:endParaRPr lang="en-US"/>
+          </a:p>
+        </p:txBody>
+      </p:sp>
+      <p:sp>
+        <p:nvSpPr>
+          <p:cNvPr id="4" name="Slide Number Placeholder 3">
+            <a:extLst>
+              <a:ext uri="{FF2B5EF4-FFF2-40B4-BE49-F238E27FC236}">
+                <a16:creationId xmlns:a16="http://schemas.microsoft.com/office/drawing/2014/main" id="{BEC057EA-A1AE-CE69-A137-0CA22213683D}"/>
+              </a:ext>
+            </a:extLst>
+          </p:cNvPr>
+          <p:cNvSpPr>
+            <a:spLocks noGrp="1"/>
+          </p:cNvSpPr>
+          <p:nvPr>
+            <p:ph type="sldNum" sz="quarter" idx="12"/>
+          </p:nvPr>
+        </p:nvSpPr>
+        <p:spPr/>
+        <p:txBody>
+          <a:bodyPr/>
+          <a:lstStyle/>
+          <a:p>
+            <a:fld id="{E120E24D-9AC4-413F-A247-89E1AB2D5697}" type="slidenum">
+              <a:rPr lang="nl-BE" smtClean="0"/>
+              <a:t>34</a:t>
+            </a:fld>
+            <a:endParaRPr lang="nl-BE"/>
+          </a:p>
+        </p:txBody>
+      </p:sp>
+    </p:spTree>
+    <p:extLst>
+      <p:ext uri="{BB962C8B-B14F-4D97-AF65-F5344CB8AC3E}">
+        <p14:creationId xmlns:p14="http://schemas.microsoft.com/office/powerpoint/2010/main" val="710141799"/>
+      </p:ext>
+    </p:extLst>
+  </p:cSld>
+  <p:clrMapOvr>
+    <a:masterClrMapping/>
+  </p:clrMapOvr>
+</p:sld>
+</file>
+
+<file path=ppt/slides/slide35.xml><?xml version="1.0" encoding="utf-8"?>
+<p:sld xmlns:a="http://schemas.openxmlformats.org/drawingml/2006/main" xmlns:r="http://schemas.openxmlformats.org/officeDocument/2006/relationships" xmlns:p="http://schemas.openxmlformats.org/presentationml/2006/main">
+  <p:cSld>
+    <p:spTree>
+      <p:nvGrpSpPr>
+        <p:cNvPr id="1" name=""/>
+        <p:cNvGrpSpPr/>
+        <p:nvPr/>
+      </p:nvGrpSpPr>
+      <p:grpSpPr>
+        <a:xfrm>
+          <a:off x="0" y="0"/>
+          <a:ext cx="0" cy="0"/>
+          <a:chOff x="0" y="0"/>
+          <a:chExt cx="0" cy="0"/>
+        </a:xfrm>
+      </p:grpSpPr>
+      <p:sp>
+        <p:nvSpPr>
+          <p:cNvPr id="2" name="Title 1">
+            <a:extLst>
+              <a:ext uri="{FF2B5EF4-FFF2-40B4-BE49-F238E27FC236}">
+                <a16:creationId xmlns:a16="http://schemas.microsoft.com/office/drawing/2014/main" id="{24643650-DCA6-CE11-EFB4-D51F7296FA8A}"/>
+              </a:ext>
+            </a:extLst>
+          </p:cNvPr>
+          <p:cNvSpPr>
+            <a:spLocks noGrp="1"/>
+          </p:cNvSpPr>
+          <p:nvPr>
+            <p:ph type="title"/>
+          </p:nvPr>
+        </p:nvSpPr>
+        <p:spPr/>
+        <p:txBody>
+          <a:bodyPr/>
+          <a:lstStyle/>
+          <a:p>
+            <a:endParaRPr lang="en-US"/>
+          </a:p>
+        </p:txBody>
+      </p:sp>
+      <p:sp>
+        <p:nvSpPr>
+          <p:cNvPr id="3" name="Content Placeholder 2">
+            <a:extLst>
+              <a:ext uri="{FF2B5EF4-FFF2-40B4-BE49-F238E27FC236}">
+                <a16:creationId xmlns:a16="http://schemas.microsoft.com/office/drawing/2014/main" id="{6465E1D3-9958-F0DF-D6AE-BE6DF6BC0AE7}"/>
+              </a:ext>
+            </a:extLst>
+          </p:cNvPr>
+          <p:cNvSpPr>
+            <a:spLocks noGrp="1"/>
+          </p:cNvSpPr>
+          <p:nvPr>
+            <p:ph idx="1"/>
+          </p:nvPr>
+        </p:nvSpPr>
+        <p:spPr/>
+        <p:txBody>
+          <a:bodyPr/>
+          <a:lstStyle/>
+          <a:p>
+            <a:endParaRPr lang="en-US"/>
+          </a:p>
+        </p:txBody>
+      </p:sp>
+      <p:sp>
+        <p:nvSpPr>
+          <p:cNvPr id="4" name="Slide Number Placeholder 3">
+            <a:extLst>
+              <a:ext uri="{FF2B5EF4-FFF2-40B4-BE49-F238E27FC236}">
+                <a16:creationId xmlns:a16="http://schemas.microsoft.com/office/drawing/2014/main" id="{6239B41E-0BC7-8D00-D50B-1CDB38BC9D2D}"/>
+              </a:ext>
+            </a:extLst>
+          </p:cNvPr>
+          <p:cNvSpPr>
+            <a:spLocks noGrp="1"/>
+          </p:cNvSpPr>
+          <p:nvPr>
+            <p:ph type="sldNum" sz="quarter" idx="12"/>
+          </p:nvPr>
+        </p:nvSpPr>
+        <p:spPr/>
+        <p:txBody>
+          <a:bodyPr/>
+          <a:lstStyle/>
+          <a:p>
+            <a:fld id="{E120E24D-9AC4-413F-A247-89E1AB2D5697}" type="slidenum">
+              <a:rPr lang="nl-BE" smtClean="0"/>
+              <a:t>35</a:t>
+            </a:fld>
+            <a:endParaRPr lang="nl-BE"/>
+          </a:p>
+        </p:txBody>
+      </p:sp>
+    </p:spTree>
+    <p:extLst>
+      <p:ext uri="{BB962C8B-B14F-4D97-AF65-F5344CB8AC3E}">
+        <p14:creationId xmlns:p14="http://schemas.microsoft.com/office/powerpoint/2010/main" val="2790253825"/>
+      </p:ext>
+    </p:extLst>
+  </p:cSld>
+  <p:clrMapOvr>
+    <a:masterClrMapping/>
+  </p:clrMapOvr>
+</p:sld>
+</file>
+
+<file path=ppt/slides/slide36.xml><?xml version="1.0" encoding="utf-8"?>
+<p:sld xmlns:a="http://schemas.openxmlformats.org/drawingml/2006/main" xmlns:r="http://schemas.openxmlformats.org/officeDocument/2006/relationships" xmlns:p="http://schemas.openxmlformats.org/presentationml/2006/main">
+  <p:cSld>
+    <p:spTree>
+      <p:nvGrpSpPr>
+        <p:cNvPr id="1" name=""/>
+        <p:cNvGrpSpPr/>
+        <p:nvPr/>
+      </p:nvGrpSpPr>
+      <p:grpSpPr>
+        <a:xfrm>
+          <a:off x="0" y="0"/>
+          <a:ext cx="0" cy="0"/>
+          <a:chOff x="0" y="0"/>
+          <a:chExt cx="0" cy="0"/>
+        </a:xfrm>
+      </p:grpSpPr>
+      <p:sp>
+        <p:nvSpPr>
           <p:cNvPr id="5" name="Title 4">
             <a:extLst>
               <a:ext uri="{FF2B5EF4-FFF2-40B4-BE49-F238E27FC236}">
@@ -11643,7 +12227,7 @@
           <a:p>
             <a:fld id="{E120E24D-9AC4-413F-A247-89E1AB2D5697}" type="slidenum">
               <a:rPr lang="nl-BE" smtClean="0"/>
-              <a:t>33</a:t>
+              <a:t>36</a:t>
             </a:fld>
             <a:endParaRPr lang="nl-BE"/>
           </a:p>
@@ -11712,7 +12296,7 @@
         </p:blipFill>
         <p:spPr bwMode="auto">
           <a:xfrm>
-            <a:off x="677334" y="1727547"/>
+            <a:off x="677334" y="1795464"/>
             <a:ext cx="8464420" cy="3800314"/>
           </a:xfrm>
           <a:prstGeom prst="rect">
@@ -11872,7 +12456,7 @@
 </file>
 
 <file path=ppt/slides/slide5.xml><?xml version="1.0" encoding="utf-8"?>
-<p:sld xmlns:a="http://schemas.openxmlformats.org/drawingml/2006/main" xmlns:r="http://schemas.openxmlformats.org/officeDocument/2006/relationships" xmlns:p="http://schemas.openxmlformats.org/presentationml/2006/main">
+<p:sld xmlns:a="http://schemas.openxmlformats.org/drawingml/2006/main" xmlns:r="http://schemas.openxmlformats.org/officeDocument/2006/relationships" xmlns:p="http://schemas.openxmlformats.org/presentationml/2006/main" show="0">
   <p:cSld>
     <p:spTree>
       <p:nvGrpSpPr>

</xml_diff>